<commit_message>
Update presentation and timings
</commit_message>
<xml_diff>
--- a/docs/Presentations/DayPlan/Full Presentation.pptx
+++ b/docs/Presentations/DayPlan/Full Presentation.pptx
@@ -17185,7 +17185,7 @@
         <p:spPr>
           <a:xfrm>
             <a:off x="4253345" y="651164"/>
-            <a:ext cx="2101857" cy="369332"/>
+            <a:ext cx="5104154" cy="923330"/>
           </a:xfrm>
           <a:prstGeom prst="rect">
             <a:avLst/>
@@ -17200,7 +17200,19 @@
           <a:p>
             <a:r>
               <a:rPr lang="en-GB" dirty="0"/>
-              <a:t>MORE ABOUT WHY</a:t>
+              <a:t>MORE ABOUT WHY ITS COOL AND </a:t>
+            </a:r>
+          </a:p>
+          <a:p>
+            <a:r>
+              <a:rPr lang="en-GB" dirty="0"/>
+              <a:t>AS CLEAR AS POSSIBLE ABOUT HOW IT FITS INTO</a:t>
+            </a:r>
+          </a:p>
+          <a:p>
+            <a:r>
+              <a:rPr lang="en-GB" dirty="0"/>
+              <a:t>THE PREVIOUS ACTIVITIES AND WHATS NEXT </a:t>
             </a:r>
           </a:p>
         </p:txBody>
@@ -20222,7 +20234,13 @@
             </a:r>
             <a:r>
               <a:rPr lang="en-US" dirty="0">
-                <a:hlinkClick r:id="rId2"/>
+                <a:hlinkClick r:id="rId2">
+                  <a:extLst>
+                    <a:ext uri="{A12FA001-AC4F-418D-AE19-62706E023703}">
+                      <ahyp:hlinkClr xmlns:ahyp="http://schemas.microsoft.com/office/drawing/2018/hyperlinkcolor" val="tx"/>
+                    </a:ext>
+                  </a:extLst>
+                </a:hlinkClick>
               </a:rPr>
               <a:t>Feedback Survey</a:t>
             </a:r>

</xml_diff>